<commit_message>
Stages ready for this weekend + cleanup
</commit_message>
<xml_diff>
--- a/11-15 rounds/Four and Four - 12 rounds - Comstock/Four and Four.pptx
+++ b/11-15 rounds/Four and Four - 12 rounds - Comstock/Four and Four.pptx
@@ -259,7 +259,7 @@
               <a:pPr>
                 <a:defRPr/>
               </a:pPr>
-              <a:t>7/19/2021</a:t>
+              <a:t>7/20/2021</a:t>
             </a:fld>
             <a:endParaRPr lang="en-US"/>
           </a:p>
@@ -4164,7 +4164,7 @@
           <p:nvPr>
             <p:extLst>
               <p:ext uri="{D42A27DB-BD31-4B8C-83A1-F6EECF244321}">
-                <p14:modId xmlns:p14="http://schemas.microsoft.com/office/powerpoint/2010/main" val="3836775844"/>
+                <p14:modId xmlns:p14="http://schemas.microsoft.com/office/powerpoint/2010/main" val="2290500269"/>
               </p:ext>
             </p:extLst>
           </p:nvPr>
@@ -4323,22 +4323,24 @@
                         <a:buFontTx/>
                         <a:buNone/>
                         <a:tabLst/>
+                        <a:defRPr/>
                       </a:pPr>
                       <a:r>
-                        <a:rPr kumimoji="0" lang="en-US" sz="1400" b="1" i="0" u="none" strike="noStrike" cap="none" normalizeH="0" baseline="0" dirty="0">
-                          <a:ln>
-                            <a:noFill/>
-                          </a:ln>
-                          <a:solidFill>
-                            <a:schemeClr val="tx1"/>
-                          </a:solidFill>
-                          <a:effectLst/>
-                          <a:latin typeface="Arial" charset="0"/>
-                          <a:ea typeface="ＭＳ Ｐゴシック" pitchFamily="-112" charset="-128"/>
-                          <a:cs typeface="Times New Roman" pitchFamily="-112" charset="0"/>
-                        </a:rPr>
-                        <a:t>4 and 4</a:t>
+                        <a:rPr lang="en-US" sz="1400" b="1"/>
+                        <a:t>Four and Four</a:t>
                       </a:r>
+                      <a:endParaRPr kumimoji="0" lang="en-US" sz="1400" b="1" i="0" u="none" strike="noStrike" cap="none" normalizeH="0" baseline="0" dirty="0">
+                        <a:ln>
+                          <a:noFill/>
+                        </a:ln>
+                        <a:solidFill>
+                          <a:schemeClr val="tx1"/>
+                        </a:solidFill>
+                        <a:effectLst/>
+                        <a:latin typeface="Arial" charset="0"/>
+                        <a:ea typeface="ＭＳ Ｐゴシック" pitchFamily="-112" charset="-128"/>
+                        <a:cs typeface="Times New Roman" pitchFamily="-112" charset="0"/>
+                      </a:endParaRPr>
                     </a:p>
                     <a:p>
                       <a:pPr marL="0" marR="0" lvl="0" indent="0" algn="ctr" defTabSz="966788" rtl="0" eaLnBrk="1" fontAlgn="base" latinLnBrk="0" hangingPunct="1">
@@ -5196,7 +5198,7 @@
         <p:spPr>
           <a:xfrm>
             <a:off x="341833" y="384562"/>
-            <a:ext cx="6699903" cy="5078313"/>
+            <a:ext cx="6699903" cy="4801314"/>
           </a:xfrm>
           <a:prstGeom prst="rect">
             <a:avLst/>
@@ -5212,7 +5214,7 @@
             <a:pPr algn="ctr"/>
             <a:r>
               <a:rPr lang="en-US" b="1" dirty="0"/>
-              <a:t>Eight and Six</a:t>
+              <a:t>Four and Four</a:t>
             </a:r>
           </a:p>
           <a:p>
@@ -5225,23 +5227,7 @@
           <a:p>
             <a:r>
               <a:rPr lang="en-US" dirty="0"/>
-              <a:t>Eight and Six is </a:t>
-            </a:r>
-            <a:r>
-              <a:rPr lang="en-US"/>
-              <a:t>a 12 </a:t>
-            </a:r>
-            <a:r>
-              <a:rPr lang="en-US" dirty="0"/>
-              <a:t>round</a:t>
-            </a:r>
-            <a:r>
-              <a:rPr lang="en-US"/>
-              <a:t>, 60 </a:t>
-            </a:r>
-            <a:r>
-              <a:rPr lang="en-US" dirty="0"/>
-              <a:t>point, Comstock speed shoot. The best 4 hits on paper will score, and steel must fall to score. The start signal is audible.</a:t>
+              <a:t>Four and Four is a 12 round, 60 point, Comstock speed shoot. The best 4 hits on paper will score, and steel must fall to score. The start signal is audible.</a:t>
             </a:r>
           </a:p>
           <a:p>
@@ -5277,7 +5263,7 @@
           <a:p>
             <a:r>
               <a:rPr lang="en-US" dirty="0"/>
-              <a:t>On start signal, engage paper targets with 2 rounds each, perform a mandatory reload, and engage with 2 rounds each. Steel may be engaged at any time in any order.</a:t>
+              <a:t>On start signal, engage the steel OR the paper targets, perform a mandatory reload, and engage the remaining array.</a:t>
             </a:r>
           </a:p>
         </p:txBody>

</xml_diff>